<commit_message>
Update 01-01 What is a Web API.pptx
</commit_message>
<xml_diff>
--- a/module-1/01-01 What is a Web API/01-01 What is a Web API.pptx
+++ b/module-1/01-01 What is a Web API/01-01 What is a Web API.pptx
@@ -7,15 +7,16 @@
     <p:sldMasterId id="2147483720" r:id="rId3"/>
   </p:sldMasterIdLst>
   <p:notesMasterIdLst>
-    <p:notesMasterId r:id="rId10"/>
+    <p:notesMasterId r:id="rId11"/>
   </p:notesMasterIdLst>
   <p:sldIdLst>
     <p:sldId id="256" r:id="rId4"/>
-    <p:sldId id="257" r:id="rId5"/>
-    <p:sldId id="314" r:id="rId6"/>
-    <p:sldId id="313" r:id="rId7"/>
-    <p:sldId id="312" r:id="rId8"/>
-    <p:sldId id="311" r:id="rId9"/>
+    <p:sldId id="315" r:id="rId5"/>
+    <p:sldId id="257" r:id="rId6"/>
+    <p:sldId id="314" r:id="rId7"/>
+    <p:sldId id="313" r:id="rId8"/>
+    <p:sldId id="312" r:id="rId9"/>
+    <p:sldId id="311" r:id="rId10"/>
   </p:sldIdLst>
   <p:sldSz cx="12192000" cy="6858000"/>
   <p:notesSz cx="6858000" cy="9144000"/>
@@ -204,7 +205,7 @@
           <a:p>
             <a:fld id="{80461A19-0AC6-45CE-9936-8ED2930E5154}" type="datetimeFigureOut">
               <a:rPr lang="en-US" smtClean="0"/>
-              <a:t>12/21/2022</a:t>
+              <a:t>8/3/23</a:t>
             </a:fld>
             <a:endParaRPr lang="en-US"/>
           </a:p>
@@ -699,7 +700,7 @@
           <a:p>
             <a:fld id="{C70E03BD-25A7-4674-8CC2-6C56BFB98E22}" type="datetimeFigureOut">
               <a:rPr lang="en-US" smtClean="0"/>
-              <a:t>12/21/2022</a:t>
+              <a:t>8/3/23</a:t>
             </a:fld>
             <a:endParaRPr lang="en-US"/>
           </a:p>
@@ -907,7 +908,7 @@
           <a:p>
             <a:fld id="{C70E03BD-25A7-4674-8CC2-6C56BFB98E22}" type="datetimeFigureOut">
               <a:rPr lang="en-US" smtClean="0"/>
-              <a:t>12/21/2022</a:t>
+              <a:t>8/3/23</a:t>
             </a:fld>
             <a:endParaRPr lang="en-US"/>
           </a:p>
@@ -1165,7 +1166,7 @@
           <a:p>
             <a:fld id="{C70E03BD-25A7-4674-8CC2-6C56BFB98E22}" type="datetimeFigureOut">
               <a:rPr lang="en-US" smtClean="0"/>
-              <a:t>12/21/2022</a:t>
+              <a:t>8/3/23</a:t>
             </a:fld>
             <a:endParaRPr lang="en-US"/>
           </a:p>
@@ -1405,7 +1406,7 @@
           <a:p>
             <a:fld id="{D088F999-7A4E-6B4F-9FED-EF75B73AD044}" type="datetimeFigureOut">
               <a:rPr lang="en-US" smtClean="0"/>
-              <a:t>12/21/2022</a:t>
+              <a:t>8/3/23</a:t>
             </a:fld>
             <a:endParaRPr lang="en-US"/>
           </a:p>
@@ -1573,7 +1574,7 @@
           <a:p>
             <a:fld id="{D088F999-7A4E-6B4F-9FED-EF75B73AD044}" type="datetimeFigureOut">
               <a:rPr lang="en-US" smtClean="0"/>
-              <a:t>12/21/2022</a:t>
+              <a:t>8/3/23</a:t>
             </a:fld>
             <a:endParaRPr lang="en-US"/>
           </a:p>
@@ -1818,7 +1819,7 @@
           <a:p>
             <a:fld id="{D088F999-7A4E-6B4F-9FED-EF75B73AD044}" type="datetimeFigureOut">
               <a:rPr lang="en-US" smtClean="0"/>
-              <a:t>12/21/2022</a:t>
+              <a:t>8/3/23</a:t>
             </a:fld>
             <a:endParaRPr lang="en-US"/>
           </a:p>
@@ -2103,7 +2104,7 @@
           <a:p>
             <a:fld id="{D088F999-7A4E-6B4F-9FED-EF75B73AD044}" type="datetimeFigureOut">
               <a:rPr lang="en-US" smtClean="0"/>
-              <a:t>12/21/2022</a:t>
+              <a:t>8/3/23</a:t>
             </a:fld>
             <a:endParaRPr lang="en-US"/>
           </a:p>
@@ -2522,7 +2523,7 @@
           <a:p>
             <a:fld id="{D088F999-7A4E-6B4F-9FED-EF75B73AD044}" type="datetimeFigureOut">
               <a:rPr lang="en-US" smtClean="0"/>
-              <a:t>12/21/2022</a:t>
+              <a:t>8/3/23</a:t>
             </a:fld>
             <a:endParaRPr lang="en-US"/>
           </a:p>
@@ -2639,7 +2640,7 @@
           <a:p>
             <a:fld id="{D088F999-7A4E-6B4F-9FED-EF75B73AD044}" type="datetimeFigureOut">
               <a:rPr lang="en-US" smtClean="0"/>
-              <a:t>12/21/2022</a:t>
+              <a:t>8/3/23</a:t>
             </a:fld>
             <a:endParaRPr lang="en-US"/>
           </a:p>
@@ -2734,7 +2735,7 @@
           <a:p>
             <a:fld id="{D088F999-7A4E-6B4F-9FED-EF75B73AD044}" type="datetimeFigureOut">
               <a:rPr lang="en-US" smtClean="0"/>
-              <a:t>12/21/2022</a:t>
+              <a:t>8/3/23</a:t>
             </a:fld>
             <a:endParaRPr lang="en-US"/>
           </a:p>
@@ -3009,7 +3010,7 @@
           <a:p>
             <a:fld id="{D088F999-7A4E-6B4F-9FED-EF75B73AD044}" type="datetimeFigureOut">
               <a:rPr lang="en-US" smtClean="0"/>
-              <a:t>12/21/2022</a:t>
+              <a:t>8/3/23</a:t>
             </a:fld>
             <a:endParaRPr lang="en-US"/>
           </a:p>
@@ -3179,7 +3180,7 @@
           <a:p>
             <a:fld id="{C70E03BD-25A7-4674-8CC2-6C56BFB98E22}" type="datetimeFigureOut">
               <a:rPr lang="en-US" smtClean="0"/>
-              <a:t>12/21/2022</a:t>
+              <a:t>8/3/23</a:t>
             </a:fld>
             <a:endParaRPr lang="en-US"/>
           </a:p>
@@ -3431,7 +3432,7 @@
           <a:p>
             <a:fld id="{D088F999-7A4E-6B4F-9FED-EF75B73AD044}" type="datetimeFigureOut">
               <a:rPr lang="en-US" smtClean="0"/>
-              <a:t>12/21/2022</a:t>
+              <a:t>8/3/23</a:t>
             </a:fld>
             <a:endParaRPr lang="en-US"/>
           </a:p>
@@ -3599,7 +3600,7 @@
           <a:p>
             <a:fld id="{D088F999-7A4E-6B4F-9FED-EF75B73AD044}" type="datetimeFigureOut">
               <a:rPr lang="en-US" smtClean="0"/>
-              <a:t>12/21/2022</a:t>
+              <a:t>8/3/23</a:t>
             </a:fld>
             <a:endParaRPr lang="en-US"/>
           </a:p>
@@ -3777,7 +3778,7 @@
           <a:p>
             <a:fld id="{D088F999-7A4E-6B4F-9FED-EF75B73AD044}" type="datetimeFigureOut">
               <a:rPr lang="en-US" smtClean="0"/>
-              <a:t>12/21/2022</a:t>
+              <a:t>8/3/23</a:t>
             </a:fld>
             <a:endParaRPr lang="en-US"/>
           </a:p>
@@ -3991,7 +3992,7 @@
               <a:pPr>
                 <a:defRPr/>
               </a:pPr>
-              <a:t>12/21/2022</a:t>
+              <a:t>8/3/23</a:t>
             </a:fld>
             <a:endParaRPr lang="en-US"/>
           </a:p>
@@ -4198,7 +4199,7 @@
               <a:pPr>
                 <a:defRPr/>
               </a:pPr>
-              <a:t>12/21/2022</a:t>
+              <a:t>8/3/23</a:t>
             </a:fld>
             <a:endParaRPr lang="en-US"/>
           </a:p>
@@ -4482,7 +4483,7 @@
               <a:pPr>
                 <a:defRPr/>
               </a:pPr>
-              <a:t>12/21/2022</a:t>
+              <a:t>8/3/23</a:t>
             </a:fld>
             <a:endParaRPr lang="en-US"/>
           </a:p>
@@ -4756,7 +4757,7 @@
               <a:pPr>
                 <a:defRPr/>
               </a:pPr>
-              <a:t>12/21/2022</a:t>
+              <a:t>8/3/23</a:t>
             </a:fld>
             <a:endParaRPr lang="en-US"/>
           </a:p>
@@ -5177,7 +5178,7 @@
               <a:pPr>
                 <a:defRPr/>
               </a:pPr>
-              <a:t>12/21/2022</a:t>
+              <a:t>8/3/23</a:t>
             </a:fld>
             <a:endParaRPr lang="en-US"/>
           </a:p>
@@ -5327,7 +5328,7 @@
               <a:pPr>
                 <a:defRPr/>
               </a:pPr>
-              <a:t>12/21/2022</a:t>
+              <a:t>8/3/23</a:t>
             </a:fld>
             <a:endParaRPr lang="en-US"/>
           </a:p>
@@ -5449,7 +5450,7 @@
               <a:pPr>
                 <a:defRPr/>
               </a:pPr>
-              <a:t>12/21/2022</a:t>
+              <a:t>8/3/23</a:t>
             </a:fld>
             <a:endParaRPr lang="en-US"/>
           </a:p>
@@ -5801,7 +5802,7 @@
           <a:p>
             <a:fld id="{C70E03BD-25A7-4674-8CC2-6C56BFB98E22}" type="datetimeFigureOut">
               <a:rPr lang="en-US" smtClean="0"/>
-              <a:t>12/21/2022</a:t>
+              <a:t>8/3/23</a:t>
             </a:fld>
             <a:endParaRPr lang="en-US"/>
           </a:p>
@@ -6144,7 +6145,7 @@
               <a:pPr>
                 <a:defRPr/>
               </a:pPr>
-              <a:t>12/21/2022</a:t>
+              <a:t>8/3/23</a:t>
             </a:fld>
             <a:endParaRPr lang="en-US"/>
           </a:p>
@@ -6441,7 +6442,7 @@
               <a:pPr>
                 <a:defRPr/>
               </a:pPr>
-              <a:t>12/21/2022</a:t>
+              <a:t>8/3/23</a:t>
             </a:fld>
             <a:endParaRPr lang="en-US"/>
           </a:p>
@@ -6648,7 +6649,7 @@
               <a:pPr>
                 <a:defRPr/>
               </a:pPr>
-              <a:t>12/21/2022</a:t>
+              <a:t>8/3/23</a:t>
             </a:fld>
             <a:endParaRPr lang="en-US"/>
           </a:p>
@@ -6865,7 +6866,7 @@
               <a:pPr>
                 <a:defRPr/>
               </a:pPr>
-              <a:t>12/21/2022</a:t>
+              <a:t>8/3/23</a:t>
             </a:fld>
             <a:endParaRPr lang="en-US"/>
           </a:p>
@@ -7174,7 +7175,7 @@
           <a:p>
             <a:fld id="{C70E03BD-25A7-4674-8CC2-6C56BFB98E22}" type="datetimeFigureOut">
               <a:rPr lang="en-US" smtClean="0"/>
-              <a:t>12/21/2022</a:t>
+              <a:t>8/3/23</a:t>
             </a:fld>
             <a:endParaRPr lang="en-US"/>
           </a:p>
@@ -7557,7 +7558,7 @@
           <a:p>
             <a:fld id="{C70E03BD-25A7-4674-8CC2-6C56BFB98E22}" type="datetimeFigureOut">
               <a:rPr lang="en-US" smtClean="0"/>
-              <a:t>12/21/2022</a:t>
+              <a:t>8/3/23</a:t>
             </a:fld>
             <a:endParaRPr lang="en-US"/>
           </a:p>
@@ -7675,7 +7676,7 @@
           <a:p>
             <a:fld id="{C70E03BD-25A7-4674-8CC2-6C56BFB98E22}" type="datetimeFigureOut">
               <a:rPr lang="en-US" smtClean="0"/>
-              <a:t>12/21/2022</a:t>
+              <a:t>8/3/23</a:t>
             </a:fld>
             <a:endParaRPr lang="en-US"/>
           </a:p>
@@ -7848,7 +7849,7 @@
           <a:p>
             <a:fld id="{C70E03BD-25A7-4674-8CC2-6C56BFB98E22}" type="datetimeFigureOut">
               <a:rPr lang="en-US" smtClean="0"/>
-              <a:t>12/21/2022</a:t>
+              <a:t>8/3/23</a:t>
             </a:fld>
             <a:endParaRPr lang="en-US"/>
           </a:p>
@@ -8204,7 +8205,7 @@
           <a:p>
             <a:fld id="{C70E03BD-25A7-4674-8CC2-6C56BFB98E22}" type="datetimeFigureOut">
               <a:rPr lang="en-US" smtClean="0"/>
-              <a:t>12/21/2022</a:t>
+              <a:t>8/3/23</a:t>
             </a:fld>
             <a:endParaRPr lang="en-US"/>
           </a:p>
@@ -8552,7 +8553,7 @@
           <a:p>
             <a:fld id="{C70E03BD-25A7-4674-8CC2-6C56BFB98E22}" type="datetimeFigureOut">
               <a:rPr lang="en-US" smtClean="0"/>
-              <a:t>12/21/2022</a:t>
+              <a:t>8/3/23</a:t>
             </a:fld>
             <a:endParaRPr lang="en-US"/>
           </a:p>
@@ -8863,7 +8864,7 @@
           <a:p>
             <a:fld id="{C70E03BD-25A7-4674-8CC2-6C56BFB98E22}" type="datetimeFigureOut">
               <a:rPr lang="en-US" smtClean="0"/>
-              <a:t>12/21/2022</a:t>
+              <a:t>8/3/23</a:t>
             </a:fld>
             <a:endParaRPr lang="en-US"/>
           </a:p>
@@ -9529,7 +9530,7 @@
           <a:p>
             <a:fld id="{D088F999-7A4E-6B4F-9FED-EF75B73AD044}" type="datetimeFigureOut">
               <a:rPr lang="en-US" smtClean="0"/>
-              <a:t>12/21/2022</a:t>
+              <a:t>8/3/23</a:t>
             </a:fld>
             <a:endParaRPr lang="en-US"/>
           </a:p>
@@ -10055,7 +10056,7 @@
           <a:p>
             <a:fld id="{06F159A1-E542-4BB7-9A6F-9E9F9FBC07F6}" type="datetimeFigureOut">
               <a:rPr lang="en-US" smtClean="0"/>
-              <a:t>12/21/2022</a:t>
+              <a:t>8/3/23</a:t>
             </a:fld>
             <a:endParaRPr lang="en-US"/>
           </a:p>
@@ -10671,6 +10672,438 @@
           <a:chExt cx="0" cy="0"/>
         </a:xfrm>
       </p:grpSpPr>
+      <p:sp useBgFill="1">
+        <p:nvSpPr>
+          <p:cNvPr id="9" name="Rectangle 8">
+            <a:extLst>
+              <a:ext uri="{FF2B5EF4-FFF2-40B4-BE49-F238E27FC236}">
+                <a16:creationId xmlns:a16="http://schemas.microsoft.com/office/drawing/2014/main" id="{311973C2-EB8B-452A-A698-4A252FD3AE28}"/>
+              </a:ext>
+              <a:ext uri="{C183D7F6-B498-43B3-948B-1728B52AA6E4}">
+                <adec:decorative xmlns:adec="http://schemas.microsoft.com/office/drawing/2017/decorative" val="1"/>
+              </a:ext>
+            </a:extLst>
+          </p:cNvPr>
+          <p:cNvSpPr>
+            <a:spLocks noGrp="1" noRot="1" noChangeAspect="1" noMove="1" noResize="1" noEditPoints="1" noAdjustHandles="1" noChangeArrowheads="1" noChangeShapeType="1" noTextEdit="1"/>
+          </p:cNvSpPr>
+          <p:nvPr>
+            <p:extLst>
+              <p:ext uri="{386F3935-93C4-4BCD-93E2-E3B085C9AB24}">
+                <p16:designElem xmlns:p16="http://schemas.microsoft.com/office/powerpoint/2015/main" val="1"/>
+              </p:ext>
+            </p:extLst>
+          </p:nvPr>
+        </p:nvSpPr>
+        <p:spPr>
+          <a:xfrm>
+            <a:off x="0" y="1"/>
+            <a:ext cx="12192000" cy="6857999"/>
+          </a:xfrm>
+          <a:prstGeom prst="rect">
+            <a:avLst/>
+          </a:prstGeom>
+          <a:ln>
+            <a:noFill/>
+          </a:ln>
+        </p:spPr>
+        <p:style>
+          <a:lnRef idx="2">
+            <a:schemeClr val="accent1">
+              <a:shade val="50000"/>
+            </a:schemeClr>
+          </a:lnRef>
+          <a:fillRef idx="1">
+            <a:schemeClr val="accent1"/>
+          </a:fillRef>
+          <a:effectRef idx="0">
+            <a:schemeClr val="accent1"/>
+          </a:effectRef>
+          <a:fontRef idx="minor">
+            <a:schemeClr val="lt1"/>
+          </a:fontRef>
+        </p:style>
+        <p:txBody>
+          <a:bodyPr rtlCol="0" anchor="ctr"/>
+          <a:lstStyle/>
+          <a:p>
+            <a:pPr algn="ctr"/>
+            <a:endParaRPr lang="en-US"/>
+          </a:p>
+        </p:txBody>
+      </p:sp>
+      <p:sp useBgFill="1">
+        <p:nvSpPr>
+          <p:cNvPr id="11" name="Rectangle 10">
+            <a:extLst>
+              <a:ext uri="{FF2B5EF4-FFF2-40B4-BE49-F238E27FC236}">
+                <a16:creationId xmlns:a16="http://schemas.microsoft.com/office/drawing/2014/main" id="{10162E77-11AD-44A7-84EC-40C59EEFBD2E}"/>
+              </a:ext>
+              <a:ext uri="{C183D7F6-B498-43B3-948B-1728B52AA6E4}">
+                <adec:decorative xmlns:adec="http://schemas.microsoft.com/office/drawing/2017/decorative" val="1"/>
+              </a:ext>
+            </a:extLst>
+          </p:cNvPr>
+          <p:cNvSpPr>
+            <a:spLocks noGrp="1" noRot="1" noChangeAspect="1" noMove="1" noResize="1" noEditPoints="1" noAdjustHandles="1" noChangeArrowheads="1" noChangeShapeType="1" noTextEdit="1"/>
+          </p:cNvSpPr>
+          <p:nvPr>
+            <p:extLst>
+              <p:ext uri="{386F3935-93C4-4BCD-93E2-E3B085C9AB24}">
+                <p16:designElem xmlns:p16="http://schemas.microsoft.com/office/powerpoint/2015/main" val="1"/>
+              </p:ext>
+            </p:extLst>
+          </p:nvPr>
+        </p:nvSpPr>
+        <p:spPr>
+          <a:xfrm>
+            <a:off x="0" y="0"/>
+            <a:ext cx="12192001" cy="6334316"/>
+          </a:xfrm>
+          <a:prstGeom prst="rect">
+            <a:avLst/>
+          </a:prstGeom>
+          <a:ln>
+            <a:noFill/>
+          </a:ln>
+        </p:spPr>
+        <p:style>
+          <a:lnRef idx="2">
+            <a:schemeClr val="accent1">
+              <a:shade val="50000"/>
+            </a:schemeClr>
+          </a:lnRef>
+          <a:fillRef idx="1">
+            <a:schemeClr val="accent1"/>
+          </a:fillRef>
+          <a:effectRef idx="0">
+            <a:schemeClr val="accent1"/>
+          </a:effectRef>
+          <a:fontRef idx="minor">
+            <a:schemeClr val="lt1"/>
+          </a:fontRef>
+        </p:style>
+        <p:txBody>
+          <a:bodyPr rtlCol="0" anchor="ctr"/>
+          <a:lstStyle/>
+          <a:p>
+            <a:pPr algn="ctr"/>
+            <a:endParaRPr lang="en-US"/>
+          </a:p>
+        </p:txBody>
+      </p:sp>
+      <p:sp>
+        <p:nvSpPr>
+          <p:cNvPr id="2" name="Title 1">
+            <a:extLst>
+              <a:ext uri="{FF2B5EF4-FFF2-40B4-BE49-F238E27FC236}">
+                <a16:creationId xmlns:a16="http://schemas.microsoft.com/office/drawing/2014/main" id="{2B9ED759-B913-CB10-178F-16591D4890E3}"/>
+              </a:ext>
+            </a:extLst>
+          </p:cNvPr>
+          <p:cNvSpPr>
+            <a:spLocks noGrp="1"/>
+          </p:cNvSpPr>
+          <p:nvPr>
+            <p:ph type="title"/>
+          </p:nvPr>
+        </p:nvSpPr>
+        <p:spPr>
+          <a:xfrm>
+            <a:off x="5181601" y="634946"/>
+            <a:ext cx="6368142" cy="1450757"/>
+          </a:xfrm>
+        </p:spPr>
+        <p:txBody>
+          <a:bodyPr>
+            <a:normAutofit/>
+          </a:bodyPr>
+          <a:lstStyle/>
+          <a:p>
+            <a:r>
+              <a:rPr lang="en-US" dirty="0"/>
+              <a:t>Where to get the Code!!!	</a:t>
+            </a:r>
+          </a:p>
+        </p:txBody>
+      </p:sp>
+      <p:pic>
+        <p:nvPicPr>
+          <p:cNvPr id="5" name="Picture 4" descr="Computer script on a screen">
+            <a:extLst>
+              <a:ext uri="{FF2B5EF4-FFF2-40B4-BE49-F238E27FC236}">
+                <a16:creationId xmlns:a16="http://schemas.microsoft.com/office/drawing/2014/main" id="{8201487B-2985-5773-64D6-72900525327C}"/>
+              </a:ext>
+            </a:extLst>
+          </p:cNvPr>
+          <p:cNvPicPr>
+            <a:picLocks noChangeAspect="1"/>
+          </p:cNvPicPr>
+          <p:nvPr/>
+        </p:nvPicPr>
+        <p:blipFill rotWithShape="1">
+          <a:blip r:embed="rId2"/>
+          <a:srcRect l="7503" r="47277" b="1"/>
+          <a:stretch/>
+        </p:blipFill>
+        <p:spPr>
+          <a:xfrm>
+            <a:off x="20" y="-12128"/>
+            <a:ext cx="4654276" cy="6870127"/>
+          </a:xfrm>
+          <a:prstGeom prst="rect">
+            <a:avLst/>
+          </a:prstGeom>
+        </p:spPr>
+      </p:pic>
+      <p:cxnSp>
+        <p:nvCxnSpPr>
+          <p:cNvPr id="13" name="Straight Connector 12">
+            <a:extLst>
+              <a:ext uri="{FF2B5EF4-FFF2-40B4-BE49-F238E27FC236}">
+                <a16:creationId xmlns:a16="http://schemas.microsoft.com/office/drawing/2014/main" id="{5AB158E9-1B40-4CD6-95F0-95CA11DF7B7A}"/>
+              </a:ext>
+              <a:ext uri="{C183D7F6-B498-43B3-948B-1728B52AA6E4}">
+                <adec:decorative xmlns:adec="http://schemas.microsoft.com/office/drawing/2017/decorative" val="1"/>
+              </a:ext>
+            </a:extLst>
+          </p:cNvPr>
+          <p:cNvCxnSpPr>
+            <a:cxnSpLocks noGrp="1" noRot="1" noChangeAspect="1" noMove="1" noResize="1" noEditPoints="1" noAdjustHandles="1" noChangeArrowheads="1" noChangeShapeType="1"/>
+          </p:cNvCxnSpPr>
+          <p:nvPr>
+            <p:extLst>
+              <p:ext uri="{386F3935-93C4-4BCD-93E2-E3B085C9AB24}">
+                <p16:designElem xmlns:p16="http://schemas.microsoft.com/office/powerpoint/2015/main" val="1"/>
+              </p:ext>
+            </p:extLst>
+          </p:nvPr>
+        </p:nvCxnSpPr>
+        <p:spPr>
+          <a:xfrm>
+            <a:off x="5287617" y="2085703"/>
+            <a:ext cx="6170686" cy="0"/>
+          </a:xfrm>
+          <a:prstGeom prst="line">
+            <a:avLst/>
+          </a:prstGeom>
+          <a:ln w="6350">
+            <a:solidFill>
+              <a:schemeClr val="tx1">
+                <a:lumMod val="50000"/>
+                <a:lumOff val="50000"/>
+                <a:alpha val="90000"/>
+              </a:schemeClr>
+            </a:solidFill>
+          </a:ln>
+        </p:spPr>
+        <p:style>
+          <a:lnRef idx="1">
+            <a:schemeClr val="accent1"/>
+          </a:lnRef>
+          <a:fillRef idx="0">
+            <a:schemeClr val="accent1"/>
+          </a:fillRef>
+          <a:effectRef idx="0">
+            <a:schemeClr val="accent1"/>
+          </a:effectRef>
+          <a:fontRef idx="minor">
+            <a:schemeClr val="tx1"/>
+          </a:fontRef>
+        </p:style>
+      </p:cxnSp>
+      <p:sp>
+        <p:nvSpPr>
+          <p:cNvPr id="3" name="Content Placeholder 2">
+            <a:extLst>
+              <a:ext uri="{FF2B5EF4-FFF2-40B4-BE49-F238E27FC236}">
+                <a16:creationId xmlns:a16="http://schemas.microsoft.com/office/drawing/2014/main" id="{23B68002-7CCA-EB7D-5534-2D36226A3543}"/>
+              </a:ext>
+            </a:extLst>
+          </p:cNvPr>
+          <p:cNvSpPr>
+            <a:spLocks noGrp="1"/>
+          </p:cNvSpPr>
+          <p:nvPr>
+            <p:ph idx="1"/>
+          </p:nvPr>
+        </p:nvSpPr>
+        <p:spPr>
+          <a:xfrm>
+            <a:off x="5181601" y="2908662"/>
+            <a:ext cx="6368142" cy="2960431"/>
+          </a:xfrm>
+        </p:spPr>
+        <p:txBody>
+          <a:bodyPr>
+            <a:normAutofit/>
+          </a:bodyPr>
+          <a:lstStyle/>
+          <a:p>
+            <a:r>
+              <a:rPr lang="en-US" sz="2400" dirty="0"/>
+              <a:t>https://</a:t>
+            </a:r>
+            <a:r>
+              <a:rPr lang="en-US" sz="2400" dirty="0" err="1"/>
+              <a:t>github.com</a:t>
+            </a:r>
+            <a:r>
+              <a:rPr lang="en-US" sz="2400" dirty="0"/>
+              <a:t>/</a:t>
+            </a:r>
+            <a:r>
+              <a:rPr lang="en-US" sz="2400" dirty="0" err="1"/>
+              <a:t>cwoodruff</a:t>
+            </a:r>
+            <a:r>
+              <a:rPr lang="en-US" sz="2400" dirty="0"/>
+              <a:t>/web-</a:t>
+            </a:r>
+            <a:r>
+              <a:rPr lang="en-US" sz="2400" dirty="0" err="1"/>
+              <a:t>api</a:t>
+            </a:r>
+            <a:r>
+              <a:rPr lang="en-US" sz="2400" dirty="0"/>
+              <a:t>-workshop</a:t>
+            </a:r>
+          </a:p>
+        </p:txBody>
+      </p:sp>
+    </p:spTree>
+    <p:extLst>
+      <p:ext uri="{BB962C8B-B14F-4D97-AF65-F5344CB8AC3E}">
+        <p14:creationId xmlns:p14="http://schemas.microsoft.com/office/powerpoint/2010/main" val="2295719897"/>
+      </p:ext>
+    </p:extLst>
+  </p:cSld>
+  <p:clrMapOvr>
+    <a:masterClrMapping/>
+  </p:clrMapOvr>
+  <p:timing>
+    <p:tnLst>
+      <p:par>
+        <p:cTn id="1" dur="indefinite" restart="never" nodeType="tmRoot">
+          <p:childTnLst>
+            <p:seq concurrent="1" nextAc="seek">
+              <p:cTn id="2" dur="indefinite" nodeType="mainSeq">
+                <p:childTnLst>
+                  <p:par>
+                    <p:cTn id="3" fill="hold">
+                      <p:stCondLst>
+                        <p:cond delay="indefinite"/>
+                        <p:cond evt="onBegin" delay="0">
+                          <p:tn val="2"/>
+                        </p:cond>
+                      </p:stCondLst>
+                      <p:childTnLst>
+                        <p:par>
+                          <p:cTn id="4" fill="hold">
+                            <p:stCondLst>
+                              <p:cond delay="0"/>
+                            </p:stCondLst>
+                            <p:childTnLst>
+                              <p:par>
+                                <p:cTn id="5" presetID="10" presetClass="entr" presetSubtype="0" fill="hold" grpId="0" nodeType="withEffect">
+                                  <p:stCondLst>
+                                    <p:cond delay="1000"/>
+                                  </p:stCondLst>
+                                  <p:iterate type="lt">
+                                    <p:tmPct val="10000"/>
+                                  </p:iterate>
+                                  <p:childTnLst>
+                                    <p:set>
+                                      <p:cBhvr>
+                                        <p:cTn id="6" dur="1" fill="hold">
+                                          <p:stCondLst>
+                                            <p:cond delay="0"/>
+                                          </p:stCondLst>
+                                        </p:cTn>
+                                        <p:tgtEl>
+                                          <p:spTgt spid="2"/>
+                                        </p:tgtEl>
+                                        <p:attrNameLst>
+                                          <p:attrName>style.visibility</p:attrName>
+                                        </p:attrNameLst>
+                                      </p:cBhvr>
+                                      <p:to>
+                                        <p:strVal val="visible"/>
+                                      </p:to>
+                                    </p:set>
+                                    <p:animEffect transition="in" filter="fade">
+                                      <p:cBhvr>
+                                        <p:cTn id="7" dur="400"/>
+                                        <p:tgtEl>
+                                          <p:spTgt spid="2"/>
+                                        </p:tgtEl>
+                                      </p:cBhvr>
+                                    </p:animEffect>
+                                  </p:childTnLst>
+                                </p:cTn>
+                              </p:par>
+                            </p:childTnLst>
+                          </p:cTn>
+                        </p:par>
+                      </p:childTnLst>
+                    </p:cTn>
+                  </p:par>
+                </p:childTnLst>
+              </p:cTn>
+              <p:prevCondLst>
+                <p:cond evt="onPrev" delay="0">
+                  <p:tgtEl>
+                    <p:sldTgt/>
+                  </p:tgtEl>
+                </p:cond>
+              </p:prevCondLst>
+              <p:nextCondLst>
+                <p:cond evt="onNext" delay="0">
+                  <p:tgtEl>
+                    <p:sldTgt/>
+                  </p:tgtEl>
+                </p:cond>
+              </p:nextCondLst>
+            </p:seq>
+          </p:childTnLst>
+        </p:cTn>
+      </p:par>
+    </p:tnLst>
+    <p:bldLst>
+      <p:bldP spid="2" grpId="0"/>
+    </p:bldLst>
+  </p:timing>
+</p:sld>
+</file>
+
+<file path=ppt/slides/slide3.xml><?xml version="1.0" encoding="utf-8"?>
+<p:sld xmlns:a="http://schemas.openxmlformats.org/drawingml/2006/main" xmlns:r="http://schemas.openxmlformats.org/officeDocument/2006/relationships" xmlns:p="http://schemas.openxmlformats.org/presentationml/2006/main">
+  <p:cSld>
+    <p:bg>
+      <p:bgPr>
+        <a:solidFill>
+          <a:schemeClr val="bg1">
+            <a:lumMod val="75000"/>
+            <a:lumOff val="25000"/>
+          </a:schemeClr>
+        </a:solidFill>
+        <a:effectLst/>
+      </p:bgPr>
+    </p:bg>
+    <p:spTree>
+      <p:nvGrpSpPr>
+        <p:cNvPr id="1" name=""/>
+        <p:cNvGrpSpPr/>
+        <p:nvPr/>
+      </p:nvGrpSpPr>
+      <p:grpSpPr>
+        <a:xfrm>
+          <a:off x="0" y="0"/>
+          <a:ext cx="0" cy="0"/>
+          <a:chOff x="0" y="0"/>
+          <a:chExt cx="0" cy="0"/>
+        </a:xfrm>
+      </p:grpSpPr>
       <p:pic>
         <p:nvPicPr>
           <p:cNvPr id="1026" name="Picture 2" descr="Black Sand Dunes">
@@ -11072,7 +11505,7 @@
 </p:sld>
 </file>
 
-<file path=ppt/slides/slide3.xml><?xml version="1.0" encoding="utf-8"?>
+<file path=ppt/slides/slide4.xml><?xml version="1.0" encoding="utf-8"?>
 <p:sld xmlns:a="http://schemas.openxmlformats.org/drawingml/2006/main" xmlns:r="http://schemas.openxmlformats.org/officeDocument/2006/relationships" xmlns:p="http://schemas.openxmlformats.org/presentationml/2006/main">
   <p:cSld>
     <p:spTree>
@@ -11774,7 +12207,7 @@
 </p:sld>
 </file>
 
-<file path=ppt/slides/slide4.xml><?xml version="1.0" encoding="utf-8"?>
+<file path=ppt/slides/slide5.xml><?xml version="1.0" encoding="utf-8"?>
 <p:sld xmlns:a="http://schemas.openxmlformats.org/drawingml/2006/main" xmlns:r="http://schemas.openxmlformats.org/officeDocument/2006/relationships" xmlns:p="http://schemas.openxmlformats.org/presentationml/2006/main">
   <p:cSld>
     <p:bg>
@@ -12249,7 +12682,7 @@
 </p:sld>
 </file>
 
-<file path=ppt/slides/slide5.xml><?xml version="1.0" encoding="utf-8"?>
+<file path=ppt/slides/slide6.xml><?xml version="1.0" encoding="utf-8"?>
 <p:sld xmlns:a="http://schemas.openxmlformats.org/drawingml/2006/main" xmlns:r="http://schemas.openxmlformats.org/officeDocument/2006/relationships" xmlns:p="http://schemas.openxmlformats.org/presentationml/2006/main">
   <p:cSld>
     <p:spTree>
@@ -14505,7 +14938,7 @@
 </p:sld>
 </file>
 
-<file path=ppt/slides/slide6.xml><?xml version="1.0" encoding="utf-8"?>
+<file path=ppt/slides/slide7.xml><?xml version="1.0" encoding="utf-8"?>
 <p:sld xmlns:a="http://schemas.openxmlformats.org/drawingml/2006/main" xmlns:r="http://schemas.openxmlformats.org/officeDocument/2006/relationships" xmlns:p="http://schemas.openxmlformats.org/presentationml/2006/main">
   <p:cSld>
     <p:spTree>

</xml_diff>